<commit_message>
Corrections TO DO Figures paramétrages
</commit_message>
<xml_diff>
--- a/04_ChainesFermees/Cours/png/Figure.pptx
+++ b/04_ChainesFermees/Cours/png/Figure.pptx
@@ -203,7 +203,7 @@
           <a:p>
             <a:fld id="{6667BA71-B846-4725-9733-44CF997FE375}" type="datetimeFigureOut">
               <a:rPr lang="fr-FR" smtClean="0"/>
-              <a:t>11/01/2012</a:t>
+              <a:t>13/11/2013</a:t>
             </a:fld>
             <a:endParaRPr lang="fr-FR"/>
           </a:p>
@@ -820,7 +820,7 @@
           <a:p>
             <a:fld id="{CEE667AA-1165-4D19-A520-0AAEBAFEBFEE}" type="datetimeFigureOut">
               <a:rPr lang="fr-FR" smtClean="0"/>
-              <a:t>11/01/2012</a:t>
+              <a:t>13/11/2013</a:t>
             </a:fld>
             <a:endParaRPr lang="fr-FR"/>
           </a:p>
@@ -990,7 +990,7 @@
           <a:p>
             <a:fld id="{CEE667AA-1165-4D19-A520-0AAEBAFEBFEE}" type="datetimeFigureOut">
               <a:rPr lang="fr-FR" smtClean="0"/>
-              <a:t>11/01/2012</a:t>
+              <a:t>13/11/2013</a:t>
             </a:fld>
             <a:endParaRPr lang="fr-FR"/>
           </a:p>
@@ -1170,7 +1170,7 @@
           <a:p>
             <a:fld id="{CEE667AA-1165-4D19-A520-0AAEBAFEBFEE}" type="datetimeFigureOut">
               <a:rPr lang="fr-FR" smtClean="0"/>
-              <a:t>11/01/2012</a:t>
+              <a:t>13/11/2013</a:t>
             </a:fld>
             <a:endParaRPr lang="fr-FR"/>
           </a:p>
@@ -1340,7 +1340,7 @@
           <a:p>
             <a:fld id="{CEE667AA-1165-4D19-A520-0AAEBAFEBFEE}" type="datetimeFigureOut">
               <a:rPr lang="fr-FR" smtClean="0"/>
-              <a:t>11/01/2012</a:t>
+              <a:t>13/11/2013</a:t>
             </a:fld>
             <a:endParaRPr lang="fr-FR"/>
           </a:p>
@@ -1586,7 +1586,7 @@
           <a:p>
             <a:fld id="{CEE667AA-1165-4D19-A520-0AAEBAFEBFEE}" type="datetimeFigureOut">
               <a:rPr lang="fr-FR" smtClean="0"/>
-              <a:t>11/01/2012</a:t>
+              <a:t>13/11/2013</a:t>
             </a:fld>
             <a:endParaRPr lang="fr-FR"/>
           </a:p>
@@ -1874,7 +1874,7 @@
           <a:p>
             <a:fld id="{CEE667AA-1165-4D19-A520-0AAEBAFEBFEE}" type="datetimeFigureOut">
               <a:rPr lang="fr-FR" smtClean="0"/>
-              <a:t>11/01/2012</a:t>
+              <a:t>13/11/2013</a:t>
             </a:fld>
             <a:endParaRPr lang="fr-FR"/>
           </a:p>
@@ -2296,7 +2296,7 @@
           <a:p>
             <a:fld id="{CEE667AA-1165-4D19-A520-0AAEBAFEBFEE}" type="datetimeFigureOut">
               <a:rPr lang="fr-FR" smtClean="0"/>
-              <a:t>11/01/2012</a:t>
+              <a:t>13/11/2013</a:t>
             </a:fld>
             <a:endParaRPr lang="fr-FR"/>
           </a:p>
@@ -2414,7 +2414,7 @@
           <a:p>
             <a:fld id="{CEE667AA-1165-4D19-A520-0AAEBAFEBFEE}" type="datetimeFigureOut">
               <a:rPr lang="fr-FR" smtClean="0"/>
-              <a:t>11/01/2012</a:t>
+              <a:t>13/11/2013</a:t>
             </a:fld>
             <a:endParaRPr lang="fr-FR"/>
           </a:p>
@@ -2509,7 +2509,7 @@
           <a:p>
             <a:fld id="{CEE667AA-1165-4D19-A520-0AAEBAFEBFEE}" type="datetimeFigureOut">
               <a:rPr lang="fr-FR" smtClean="0"/>
-              <a:t>11/01/2012</a:t>
+              <a:t>13/11/2013</a:t>
             </a:fld>
             <a:endParaRPr lang="fr-FR"/>
           </a:p>
@@ -2786,7 +2786,7 @@
           <a:p>
             <a:fld id="{CEE667AA-1165-4D19-A520-0AAEBAFEBFEE}" type="datetimeFigureOut">
               <a:rPr lang="fr-FR" smtClean="0"/>
-              <a:t>11/01/2012</a:t>
+              <a:t>13/11/2013</a:t>
             </a:fld>
             <a:endParaRPr lang="fr-FR"/>
           </a:p>
@@ -3039,7 +3039,7 @@
           <a:p>
             <a:fld id="{CEE667AA-1165-4D19-A520-0AAEBAFEBFEE}" type="datetimeFigureOut">
               <a:rPr lang="fr-FR" smtClean="0"/>
-              <a:t>11/01/2012</a:t>
+              <a:t>13/11/2013</a:t>
             </a:fld>
             <a:endParaRPr lang="fr-FR"/>
           </a:p>
@@ -3252,7 +3252,7 @@
           <a:p>
             <a:fld id="{CEE667AA-1165-4D19-A520-0AAEBAFEBFEE}" type="datetimeFigureOut">
               <a:rPr lang="fr-FR" smtClean="0"/>
-              <a:t>11/01/2012</a:t>
+              <a:t>13/11/2013</a:t>
             </a:fld>
             <a:endParaRPr lang="fr-FR"/>
           </a:p>
@@ -12794,54 +12794,6 @@
       </p:sp>
       <p:sp>
         <p:nvSpPr>
-          <p:cNvPr id="86" name="Ellipse 85"/>
-          <p:cNvSpPr/>
-          <p:nvPr/>
-        </p:nvSpPr>
-        <p:spPr>
-          <a:xfrm flipH="1">
-            <a:off x="1403648" y="3422725"/>
-            <a:ext cx="261881" cy="276498"/>
-          </a:xfrm>
-          <a:prstGeom prst="ellipse">
-            <a:avLst/>
-          </a:prstGeom>
-          <a:solidFill>
-            <a:schemeClr val="bg1"/>
-          </a:solidFill>
-          <a:ln w="28575">
-            <a:solidFill>
-              <a:srgbClr val="0070C0"/>
-            </a:solidFill>
-          </a:ln>
-        </p:spPr>
-        <p:style>
-          <a:lnRef idx="2">
-            <a:schemeClr val="accent1">
-              <a:shade val="50000"/>
-            </a:schemeClr>
-          </a:lnRef>
-          <a:fillRef idx="1">
-            <a:schemeClr val="accent1"/>
-          </a:fillRef>
-          <a:effectRef idx="0">
-            <a:schemeClr val="accent1"/>
-          </a:effectRef>
-          <a:fontRef idx="minor">
-            <a:schemeClr val="lt1"/>
-          </a:fontRef>
-        </p:style>
-        <p:txBody>
-          <a:bodyPr rtlCol="0" anchor="ctr"/>
-          <a:lstStyle/>
-          <a:p>
-            <a:pPr algn="ctr"/>
-            <a:endParaRPr lang="fr-FR"/>
-          </a:p>
-        </p:txBody>
-      </p:sp>
-      <p:sp>
-        <p:nvSpPr>
           <p:cNvPr id="92" name="Ellipse 91"/>
           <p:cNvSpPr/>
           <p:nvPr/>
@@ -13182,7 +13134,7 @@
         </p:nvSpPr>
         <p:spPr>
           <a:xfrm>
-            <a:off x="1136950" y="1845847"/>
+            <a:off x="882498" y="782558"/>
             <a:ext cx="425943" cy="253916"/>
           </a:xfrm>
           <a:prstGeom prst="rect">
@@ -13540,8 +13492,8 @@
           </p:sp>
         </mc:Fallback>
       </mc:AlternateContent>
-      <mc:AlternateContent xmlns:mc="http://schemas.openxmlformats.org/markup-compatibility/2006" xmlns:a14="http://schemas.microsoft.com/office/drawing/2010/main">
-        <mc:Choice Requires="a14">
+      <mc:AlternateContent xmlns:mc="http://schemas.openxmlformats.org/markup-compatibility/2006">
+        <mc:Choice xmlns:a14="http://schemas.microsoft.com/office/drawing/2010/main" Requires="a14">
           <p:sp>
             <p:nvSpPr>
               <p:cNvPr id="82" name="ZoneTexte 81"/>
@@ -13550,7 +13502,7 @@
             </p:nvSpPr>
             <p:spPr>
               <a:xfrm>
-                <a:off x="451127" y="1955845"/>
+                <a:off x="555203" y="1998569"/>
                 <a:ext cx="389530" cy="276999"/>
               </a:xfrm>
               <a:prstGeom prst="rect">
@@ -13604,7 +13556,7 @@
             </p:txBody>
           </p:sp>
         </mc:Choice>
-        <mc:Fallback xmlns="">
+        <mc:Fallback>
           <p:sp>
             <p:nvSpPr>
               <p:cNvPr id="82" name="ZoneTexte 81"/>
@@ -13615,7 +13567,7 @@
             </p:nvSpPr>
             <p:spPr>
               <a:xfrm>
-                <a:off x="451127" y="1955845"/>
+                <a:off x="555203" y="1998569"/>
                 <a:ext cx="389530" cy="276999"/>
               </a:xfrm>
               <a:prstGeom prst="rect">
@@ -14728,6 +14680,620 @@
                 <a:blip r:embed="rId20"/>
                 <a:stretch>
                   <a:fillRect b="-8889"/>
+                </a:stretch>
+              </a:blipFill>
+            </p:spPr>
+            <p:txBody>
+              <a:bodyPr/>
+              <a:lstStyle/>
+              <a:p>
+                <a:r>
+                  <a:rPr lang="fr-FR">
+                    <a:noFill/>
+                  </a:rPr>
+                  <a:t> </a:t>
+                </a:r>
+              </a:p>
+            </p:txBody>
+          </p:sp>
+        </mc:Fallback>
+      </mc:AlternateContent>
+      <mc:AlternateContent xmlns:mc="http://schemas.openxmlformats.org/markup-compatibility/2006">
+        <mc:Choice xmlns:a14="http://schemas.microsoft.com/office/drawing/2010/main" Requires="a14">
+          <p:sp>
+            <p:nvSpPr>
+              <p:cNvPr id="42" name="ZoneTexte 41"/>
+              <p:cNvSpPr txBox="1"/>
+              <p:nvPr/>
+            </p:nvSpPr>
+            <p:spPr>
+              <a:xfrm>
+                <a:off x="2031295" y="3091922"/>
+                <a:ext cx="368754" cy="276999"/>
+              </a:xfrm>
+              <a:prstGeom prst="rect">
+                <a:avLst/>
+              </a:prstGeom>
+              <a:noFill/>
+            </p:spPr>
+            <p:txBody>
+              <a:bodyPr wrap="none" rtlCol="0">
+                <a:spAutoFit/>
+              </a:bodyPr>
+              <a:lstStyle/>
+              <a:p>
+                <a:pPr/>
+                <a14:m>
+                  <m:oMathPara xmlns:m="http://schemas.openxmlformats.org/officeDocument/2006/math">
+                    <m:oMathParaPr>
+                      <m:jc m:val="centerGroup"/>
+                    </m:oMathParaPr>
+                    <m:oMath xmlns:m="http://schemas.openxmlformats.org/officeDocument/2006/math">
+                      <m:acc>
+                        <m:accPr>
+                          <m:chr m:val="⃗"/>
+                          <m:ctrlPr>
+                            <a:rPr lang="fr-FR" sz="1200" i="1" smtClean="0">
+                              <a:latin typeface="Cambria Math"/>
+                            </a:rPr>
+                          </m:ctrlPr>
+                        </m:accPr>
+                        <m:e>
+                          <m:sSub>
+                            <m:sSubPr>
+                              <m:ctrlPr>
+                                <a:rPr lang="fr-FR" sz="1200" i="1" smtClean="0">
+                                  <a:latin typeface="Cambria Math"/>
+                                </a:rPr>
+                              </m:ctrlPr>
+                            </m:sSubPr>
+                            <m:e>
+                              <m:r>
+                                <a:rPr lang="fr-FR" sz="1200" b="0" i="1" smtClean="0">
+                                  <a:latin typeface="Cambria Math"/>
+                                </a:rPr>
+                                <m:t>𝑥</m:t>
+                              </m:r>
+                            </m:e>
+                            <m:sub>
+                              <m:r>
+                                <a:rPr lang="fr-FR" sz="1200" b="0" i="1" smtClean="0">
+                                  <a:latin typeface="Cambria Math"/>
+                                </a:rPr>
+                                <m:t>1</m:t>
+                              </m:r>
+                            </m:sub>
+                          </m:sSub>
+                        </m:e>
+                      </m:acc>
+                    </m:oMath>
+                  </m:oMathPara>
+                </a14:m>
+                <a:endParaRPr lang="fr-FR" sz="1200" dirty="0"/>
+              </a:p>
+            </p:txBody>
+          </p:sp>
+        </mc:Choice>
+        <mc:Fallback>
+          <p:sp>
+            <p:nvSpPr>
+              <p:cNvPr id="42" name="ZoneTexte 41"/>
+              <p:cNvSpPr txBox="1">
+                <a:spLocks noRot="1" noChangeAspect="1" noMove="1" noResize="1" noEditPoints="1" noAdjustHandles="1" noChangeArrowheads="1" noChangeShapeType="1" noTextEdit="1"/>
+              </p:cNvSpPr>
+              <p:nvPr/>
+            </p:nvSpPr>
+            <p:spPr>
+              <a:xfrm>
+                <a:off x="2031295" y="3091922"/>
+                <a:ext cx="368754" cy="276999"/>
+              </a:xfrm>
+              <a:prstGeom prst="rect">
+                <a:avLst/>
+              </a:prstGeom>
+              <a:blipFill rotWithShape="1">
+                <a:blip r:embed="rId21"/>
+                <a:stretch>
+                  <a:fillRect/>
+                </a:stretch>
+              </a:blipFill>
+            </p:spPr>
+            <p:txBody>
+              <a:bodyPr/>
+              <a:lstStyle/>
+              <a:p>
+                <a:r>
+                  <a:rPr lang="fr-FR">
+                    <a:noFill/>
+                  </a:rPr>
+                  <a:t> </a:t>
+                </a:r>
+              </a:p>
+            </p:txBody>
+          </p:sp>
+        </mc:Fallback>
+      </mc:AlternateContent>
+      <mc:AlternateContent xmlns:mc="http://schemas.openxmlformats.org/markup-compatibility/2006">
+        <mc:Choice xmlns:a14="http://schemas.microsoft.com/office/drawing/2010/main" Requires="a14">
+          <p:sp>
+            <p:nvSpPr>
+              <p:cNvPr id="43" name="ZoneTexte 42"/>
+              <p:cNvSpPr txBox="1"/>
+              <p:nvPr/>
+            </p:nvSpPr>
+            <p:spPr>
+              <a:xfrm>
+                <a:off x="533798" y="1667739"/>
+                <a:ext cx="372345" cy="276999"/>
+              </a:xfrm>
+              <a:prstGeom prst="rect">
+                <a:avLst/>
+              </a:prstGeom>
+              <a:noFill/>
+            </p:spPr>
+            <p:txBody>
+              <a:bodyPr wrap="none" rtlCol="0">
+                <a:spAutoFit/>
+              </a:bodyPr>
+              <a:lstStyle/>
+              <a:p>
+                <a:pPr/>
+                <a14:m>
+                  <m:oMathPara xmlns:m="http://schemas.openxmlformats.org/officeDocument/2006/math">
+                    <m:oMathParaPr>
+                      <m:jc m:val="centerGroup"/>
+                    </m:oMathParaPr>
+                    <m:oMath xmlns:m="http://schemas.openxmlformats.org/officeDocument/2006/math">
+                      <m:acc>
+                        <m:accPr>
+                          <m:chr m:val="⃗"/>
+                          <m:ctrlPr>
+                            <a:rPr lang="fr-FR" sz="1200" i="1" smtClean="0">
+                              <a:latin typeface="Cambria Math"/>
+                            </a:rPr>
+                          </m:ctrlPr>
+                        </m:accPr>
+                        <m:e>
+                          <m:sSub>
+                            <m:sSubPr>
+                              <m:ctrlPr>
+                                <a:rPr lang="fr-FR" sz="1200" i="1" smtClean="0">
+                                  <a:latin typeface="Cambria Math"/>
+                                </a:rPr>
+                              </m:ctrlPr>
+                            </m:sSubPr>
+                            <m:e>
+                              <m:r>
+                                <a:rPr lang="fr-FR" sz="1200" b="0" i="1" smtClean="0">
+                                  <a:latin typeface="Cambria Math"/>
+                                </a:rPr>
+                                <m:t>𝑥</m:t>
+                              </m:r>
+                            </m:e>
+                            <m:sub>
+                              <m:r>
+                                <a:rPr lang="fr-FR" sz="1200" b="0" i="1" smtClean="0">
+                                  <a:latin typeface="Cambria Math"/>
+                                </a:rPr>
+                                <m:t>2</m:t>
+                              </m:r>
+                            </m:sub>
+                          </m:sSub>
+                        </m:e>
+                      </m:acc>
+                    </m:oMath>
+                  </m:oMathPara>
+                </a14:m>
+                <a:endParaRPr lang="fr-FR" sz="1200" dirty="0"/>
+              </a:p>
+            </p:txBody>
+          </p:sp>
+        </mc:Choice>
+        <mc:Fallback>
+          <p:sp>
+            <p:nvSpPr>
+              <p:cNvPr id="43" name="ZoneTexte 42"/>
+              <p:cNvSpPr txBox="1">
+                <a:spLocks noRot="1" noChangeAspect="1" noMove="1" noResize="1" noEditPoints="1" noAdjustHandles="1" noChangeArrowheads="1" noChangeShapeType="1" noTextEdit="1"/>
+              </p:cNvSpPr>
+              <p:nvPr/>
+            </p:nvSpPr>
+            <p:spPr>
+              <a:xfrm>
+                <a:off x="533798" y="1667739"/>
+                <a:ext cx="372345" cy="276999"/>
+              </a:xfrm>
+              <a:prstGeom prst="rect">
+                <a:avLst/>
+              </a:prstGeom>
+              <a:blipFill rotWithShape="1">
+                <a:blip r:embed="rId22"/>
+                <a:stretch>
+                  <a:fillRect/>
+                </a:stretch>
+              </a:blipFill>
+            </p:spPr>
+            <p:txBody>
+              <a:bodyPr/>
+              <a:lstStyle/>
+              <a:p>
+                <a:r>
+                  <a:rPr lang="fr-FR">
+                    <a:noFill/>
+                  </a:rPr>
+                  <a:t> </a:t>
+                </a:r>
+              </a:p>
+            </p:txBody>
+          </p:sp>
+        </mc:Fallback>
+      </mc:AlternateContent>
+      <p:cxnSp>
+        <p:nvCxnSpPr>
+          <p:cNvPr id="46" name="Connecteur droit avec flèche 45"/>
+          <p:cNvCxnSpPr/>
+          <p:nvPr/>
+        </p:nvCxnSpPr>
+        <p:spPr>
+          <a:xfrm flipH="1" flipV="1">
+            <a:off x="840657" y="1772816"/>
+            <a:ext cx="707532" cy="1803990"/>
+          </a:xfrm>
+          <a:prstGeom prst="straightConnector1">
+            <a:avLst/>
+          </a:prstGeom>
+          <a:ln w="12700">
+            <a:solidFill>
+              <a:srgbClr val="0070C0"/>
+            </a:solidFill>
+            <a:tailEnd type="triangle" w="sm" len="lg"/>
+          </a:ln>
+        </p:spPr>
+        <p:style>
+          <a:lnRef idx="1">
+            <a:schemeClr val="accent1"/>
+          </a:lnRef>
+          <a:fillRef idx="0">
+            <a:schemeClr val="accent1"/>
+          </a:fillRef>
+          <a:effectRef idx="0">
+            <a:schemeClr val="accent1"/>
+          </a:effectRef>
+          <a:fontRef idx="minor">
+            <a:schemeClr val="tx1"/>
+          </a:fontRef>
+        </p:style>
+      </p:cxnSp>
+      <p:sp>
+        <p:nvSpPr>
+          <p:cNvPr id="86" name="Ellipse 85"/>
+          <p:cNvSpPr/>
+          <p:nvPr/>
+        </p:nvSpPr>
+        <p:spPr>
+          <a:xfrm flipH="1">
+            <a:off x="1403648" y="3422725"/>
+            <a:ext cx="261881" cy="276498"/>
+          </a:xfrm>
+          <a:prstGeom prst="ellipse">
+            <a:avLst/>
+          </a:prstGeom>
+          <a:solidFill>
+            <a:schemeClr val="bg1"/>
+          </a:solidFill>
+          <a:ln w="28575">
+            <a:solidFill>
+              <a:srgbClr val="0070C0"/>
+            </a:solidFill>
+          </a:ln>
+        </p:spPr>
+        <p:style>
+          <a:lnRef idx="2">
+            <a:schemeClr val="accent1">
+              <a:shade val="50000"/>
+            </a:schemeClr>
+          </a:lnRef>
+          <a:fillRef idx="1">
+            <a:schemeClr val="accent1"/>
+          </a:fillRef>
+          <a:effectRef idx="0">
+            <a:schemeClr val="accent1"/>
+          </a:effectRef>
+          <a:fontRef idx="minor">
+            <a:schemeClr val="lt1"/>
+          </a:fontRef>
+        </p:style>
+        <p:txBody>
+          <a:bodyPr rtlCol="0" anchor="ctr"/>
+          <a:lstStyle/>
+          <a:p>
+            <a:pPr algn="ctr"/>
+            <a:endParaRPr lang="fr-FR"/>
+          </a:p>
+        </p:txBody>
+      </p:sp>
+      <p:cxnSp>
+        <p:nvCxnSpPr>
+          <p:cNvPr id="48" name="Connecteur droit avec flèche 47"/>
+          <p:cNvCxnSpPr>
+            <a:stCxn id="92" idx="2"/>
+          </p:cNvCxnSpPr>
+          <p:nvPr/>
+        </p:nvCxnSpPr>
+        <p:spPr>
+          <a:xfrm>
+            <a:off x="1102538" y="2099762"/>
+            <a:ext cx="587824" cy="1"/>
+          </a:xfrm>
+          <a:prstGeom prst="straightConnector1">
+            <a:avLst/>
+          </a:prstGeom>
+          <a:ln w="12700">
+            <a:solidFill>
+              <a:srgbClr val="FF0000"/>
+            </a:solidFill>
+            <a:tailEnd type="triangle" w="sm" len="lg"/>
+          </a:ln>
+        </p:spPr>
+        <p:style>
+          <a:lnRef idx="1">
+            <a:schemeClr val="accent1"/>
+          </a:lnRef>
+          <a:fillRef idx="0">
+            <a:schemeClr val="accent1"/>
+          </a:fillRef>
+          <a:effectRef idx="0">
+            <a:schemeClr val="accent1"/>
+          </a:effectRef>
+          <a:fontRef idx="minor">
+            <a:schemeClr val="tx1"/>
+          </a:fontRef>
+        </p:style>
+      </p:cxnSp>
+      <mc:AlternateContent xmlns:mc="http://schemas.openxmlformats.org/markup-compatibility/2006">
+        <mc:Choice xmlns:a14="http://schemas.microsoft.com/office/drawing/2010/main" Requires="a14">
+          <p:sp>
+            <p:nvSpPr>
+              <p:cNvPr id="51" name="ZoneTexte 50"/>
+              <p:cNvSpPr txBox="1"/>
+              <p:nvPr/>
+            </p:nvSpPr>
+            <p:spPr>
+              <a:xfrm>
+                <a:off x="1396450" y="1838432"/>
+                <a:ext cx="372345" cy="276999"/>
+              </a:xfrm>
+              <a:prstGeom prst="rect">
+                <a:avLst/>
+              </a:prstGeom>
+              <a:noFill/>
+            </p:spPr>
+            <p:txBody>
+              <a:bodyPr wrap="none" rtlCol="0">
+                <a:spAutoFit/>
+              </a:bodyPr>
+              <a:lstStyle/>
+              <a:p>
+                <a:pPr/>
+                <a14:m>
+                  <m:oMathPara xmlns:m="http://schemas.openxmlformats.org/officeDocument/2006/math">
+                    <m:oMathParaPr>
+                      <m:jc m:val="centerGroup"/>
+                    </m:oMathParaPr>
+                    <m:oMath xmlns:m="http://schemas.openxmlformats.org/officeDocument/2006/math">
+                      <m:acc>
+                        <m:accPr>
+                          <m:chr m:val="⃗"/>
+                          <m:ctrlPr>
+                            <a:rPr lang="fr-FR" sz="1200" i="1" smtClean="0">
+                              <a:latin typeface="Cambria Math"/>
+                            </a:rPr>
+                          </m:ctrlPr>
+                        </m:accPr>
+                        <m:e>
+                          <m:sSub>
+                            <m:sSubPr>
+                              <m:ctrlPr>
+                                <a:rPr lang="fr-FR" sz="1200" i="1" smtClean="0">
+                                  <a:latin typeface="Cambria Math"/>
+                                </a:rPr>
+                              </m:ctrlPr>
+                            </m:sSubPr>
+                            <m:e>
+                              <m:r>
+                                <a:rPr lang="fr-FR" sz="1200" b="0" i="1" smtClean="0">
+                                  <a:latin typeface="Cambria Math"/>
+                                </a:rPr>
+                                <m:t>𝑥</m:t>
+                              </m:r>
+                            </m:e>
+                            <m:sub>
+                              <m:r>
+                                <a:rPr lang="fr-FR" sz="1200" b="0" i="1" smtClean="0">
+                                  <a:latin typeface="Cambria Math"/>
+                                </a:rPr>
+                                <m:t>3</m:t>
+                              </m:r>
+                            </m:sub>
+                          </m:sSub>
+                        </m:e>
+                      </m:acc>
+                    </m:oMath>
+                  </m:oMathPara>
+                </a14:m>
+                <a:endParaRPr lang="fr-FR" sz="1200" dirty="0"/>
+              </a:p>
+            </p:txBody>
+          </p:sp>
+        </mc:Choice>
+        <mc:Fallback>
+          <p:sp>
+            <p:nvSpPr>
+              <p:cNvPr id="51" name="ZoneTexte 50"/>
+              <p:cNvSpPr txBox="1">
+                <a:spLocks noRot="1" noChangeAspect="1" noMove="1" noResize="1" noEditPoints="1" noAdjustHandles="1" noChangeArrowheads="1" noChangeShapeType="1" noTextEdit="1"/>
+              </p:cNvSpPr>
+              <p:nvPr/>
+            </p:nvSpPr>
+            <p:spPr>
+              <a:xfrm>
+                <a:off x="1396450" y="1838432"/>
+                <a:ext cx="372345" cy="276999"/>
+              </a:xfrm>
+              <a:prstGeom prst="rect">
+                <a:avLst/>
+              </a:prstGeom>
+              <a:blipFill rotWithShape="1">
+                <a:blip r:embed="rId23"/>
+                <a:stretch>
+                  <a:fillRect/>
+                </a:stretch>
+              </a:blipFill>
+            </p:spPr>
+            <p:txBody>
+              <a:bodyPr/>
+              <a:lstStyle/>
+              <a:p>
+                <a:r>
+                  <a:rPr lang="fr-FR">
+                    <a:noFill/>
+                  </a:rPr>
+                  <a:t> </a:t>
+                </a:r>
+              </a:p>
+            </p:txBody>
+          </p:sp>
+        </mc:Fallback>
+      </mc:AlternateContent>
+      <p:sp>
+        <p:nvSpPr>
+          <p:cNvPr id="52" name="Arc 51"/>
+          <p:cNvSpPr/>
+          <p:nvPr/>
+        </p:nvSpPr>
+        <p:spPr>
+          <a:xfrm>
+            <a:off x="615241" y="1750036"/>
+            <a:ext cx="720000" cy="720000"/>
+          </a:xfrm>
+          <a:prstGeom prst="arc">
+            <a:avLst>
+              <a:gd name="adj1" fmla="val 817056"/>
+              <a:gd name="adj2" fmla="val 13498711"/>
+            </a:avLst>
+          </a:prstGeom>
+          <a:ln>
+            <a:headEnd type="stealth" w="sm" len="med"/>
+            <a:tailEnd type="none" w="med" len="med"/>
+          </a:ln>
+        </p:spPr>
+        <p:style>
+          <a:lnRef idx="1">
+            <a:schemeClr val="accent1"/>
+          </a:lnRef>
+          <a:fillRef idx="0">
+            <a:schemeClr val="accent1"/>
+          </a:fillRef>
+          <a:effectRef idx="0">
+            <a:schemeClr val="accent1"/>
+          </a:effectRef>
+          <a:fontRef idx="minor">
+            <a:schemeClr val="tx1"/>
+          </a:fontRef>
+        </p:style>
+        <p:txBody>
+          <a:bodyPr rtlCol="0" anchor="ctr"/>
+          <a:lstStyle/>
+          <a:p>
+            <a:pPr algn="ctr"/>
+            <a:endParaRPr lang="fr-FR"/>
+          </a:p>
+        </p:txBody>
+      </p:sp>
+      <mc:AlternateContent xmlns:mc="http://schemas.openxmlformats.org/markup-compatibility/2006">
+        <mc:Choice xmlns:a14="http://schemas.microsoft.com/office/drawing/2010/main" Requires="a14">
+          <p:sp>
+            <p:nvSpPr>
+              <p:cNvPr id="53" name="ZoneTexte 52"/>
+              <p:cNvSpPr txBox="1"/>
+              <p:nvPr/>
+            </p:nvSpPr>
+            <p:spPr>
+              <a:xfrm>
+                <a:off x="251520" y="2214099"/>
+                <a:ext cx="497124" cy="276999"/>
+              </a:xfrm>
+              <a:prstGeom prst="rect">
+                <a:avLst/>
+              </a:prstGeom>
+              <a:noFill/>
+            </p:spPr>
+            <p:txBody>
+              <a:bodyPr wrap="none" rtlCol="0">
+                <a:spAutoFit/>
+              </a:bodyPr>
+              <a:lstStyle/>
+              <a:p>
+                <a:pPr/>
+                <a14:m>
+                  <m:oMathPara xmlns:m="http://schemas.openxmlformats.org/officeDocument/2006/math">
+                    <m:oMathParaPr>
+                      <m:jc m:val="centerGroup"/>
+                    </m:oMathParaPr>
+                    <m:oMath xmlns:m="http://schemas.openxmlformats.org/officeDocument/2006/math">
+                      <m:r>
+                        <a:rPr lang="fr-FR" sz="1200" b="0" i="1" smtClean="0">
+                          <a:latin typeface="Cambria Math"/>
+                        </a:rPr>
+                        <m:t>𝛾</m:t>
+                      </m:r>
+                      <m:r>
+                        <a:rPr lang="fr-FR" sz="1200" b="0" i="1" smtClean="0">
+                          <a:latin typeface="Cambria Math"/>
+                        </a:rPr>
+                        <m:t>(</m:t>
+                      </m:r>
+                      <m:r>
+                        <a:rPr lang="fr-FR" sz="1200" b="0" i="1" smtClean="0">
+                          <a:latin typeface="Cambria Math"/>
+                        </a:rPr>
+                        <m:t>𝑡</m:t>
+                      </m:r>
+                      <m:r>
+                        <a:rPr lang="fr-FR" sz="1200" b="0" i="1" smtClean="0">
+                          <a:latin typeface="Cambria Math"/>
+                        </a:rPr>
+                        <m:t>)</m:t>
+                      </m:r>
+                    </m:oMath>
+                  </m:oMathPara>
+                </a14:m>
+                <a:endParaRPr lang="fr-FR" sz="1200" dirty="0"/>
+              </a:p>
+            </p:txBody>
+          </p:sp>
+        </mc:Choice>
+        <mc:Fallback>
+          <p:sp>
+            <p:nvSpPr>
+              <p:cNvPr id="53" name="ZoneTexte 52"/>
+              <p:cNvSpPr txBox="1">
+                <a:spLocks noRot="1" noChangeAspect="1" noMove="1" noResize="1" noEditPoints="1" noAdjustHandles="1" noChangeArrowheads="1" noChangeShapeType="1" noTextEdit="1"/>
+              </p:cNvSpPr>
+              <p:nvPr/>
+            </p:nvSpPr>
+            <p:spPr>
+              <a:xfrm>
+                <a:off x="251520" y="2214099"/>
+                <a:ext cx="497124" cy="276999"/>
+              </a:xfrm>
+              <a:prstGeom prst="rect">
+                <a:avLst/>
+              </a:prstGeom>
+              <a:blipFill rotWithShape="1">
+                <a:blip r:embed="rId24"/>
+                <a:stretch>
+                  <a:fillRect b="-6522"/>
                 </a:stretch>
               </a:blipFill>
             </p:spPr>

</xml_diff>